<commit_message>
adds lec 8, 9 slides
</commit_message>
<xml_diff>
--- a/Slides/Ders 9 Endeksler.pptx
+++ b/Slides/Ders 9 Endeksler.pptx
@@ -201,7 +201,7 @@
           <a:p>
             <a:fld id="{DD4244C5-5D67-C540-97C4-F007CFC432EF}" type="datetimeFigureOut">
               <a:rPr lang="tr-TR" smtClean="0"/>
-              <a:t>6.05.2023</a:t>
+              <a:t>10.05.2024</a:t>
             </a:fld>
             <a:endParaRPr lang="tr-TR"/>
           </a:p>
@@ -600,7 +600,7 @@
           <a:p>
             <a:fld id="{26396F4E-1D0B-3F44-AA0F-A3430AE5742F}" type="datetimeFigureOut">
               <a:rPr lang="tr-TR" smtClean="0"/>
-              <a:t>6.05.2023</a:t>
+              <a:t>10.05.2024</a:t>
             </a:fld>
             <a:endParaRPr lang="tr-TR"/>
           </a:p>
@@ -770,7 +770,7 @@
           <a:p>
             <a:fld id="{26396F4E-1D0B-3F44-AA0F-A3430AE5742F}" type="datetimeFigureOut">
               <a:rPr lang="tr-TR" smtClean="0"/>
-              <a:t>6.05.2023</a:t>
+              <a:t>10.05.2024</a:t>
             </a:fld>
             <a:endParaRPr lang="tr-TR"/>
           </a:p>
@@ -950,7 +950,7 @@
           <a:p>
             <a:fld id="{26396F4E-1D0B-3F44-AA0F-A3430AE5742F}" type="datetimeFigureOut">
               <a:rPr lang="tr-TR" smtClean="0"/>
-              <a:t>6.05.2023</a:t>
+              <a:t>10.05.2024</a:t>
             </a:fld>
             <a:endParaRPr lang="tr-TR"/>
           </a:p>
@@ -1120,7 +1120,7 @@
           <a:p>
             <a:fld id="{26396F4E-1D0B-3F44-AA0F-A3430AE5742F}" type="datetimeFigureOut">
               <a:rPr lang="tr-TR" smtClean="0"/>
-              <a:t>6.05.2023</a:t>
+              <a:t>10.05.2024</a:t>
             </a:fld>
             <a:endParaRPr lang="tr-TR"/>
           </a:p>
@@ -1364,7 +1364,7 @@
           <a:p>
             <a:fld id="{26396F4E-1D0B-3F44-AA0F-A3430AE5742F}" type="datetimeFigureOut">
               <a:rPr lang="tr-TR" smtClean="0"/>
-              <a:t>6.05.2023</a:t>
+              <a:t>10.05.2024</a:t>
             </a:fld>
             <a:endParaRPr lang="tr-TR"/>
           </a:p>
@@ -1596,7 +1596,7 @@
           <a:p>
             <a:fld id="{26396F4E-1D0B-3F44-AA0F-A3430AE5742F}" type="datetimeFigureOut">
               <a:rPr lang="tr-TR" smtClean="0"/>
-              <a:t>6.05.2023</a:t>
+              <a:t>10.05.2024</a:t>
             </a:fld>
             <a:endParaRPr lang="tr-TR"/>
           </a:p>
@@ -1963,7 +1963,7 @@
           <a:p>
             <a:fld id="{26396F4E-1D0B-3F44-AA0F-A3430AE5742F}" type="datetimeFigureOut">
               <a:rPr lang="tr-TR" smtClean="0"/>
-              <a:t>6.05.2023</a:t>
+              <a:t>10.05.2024</a:t>
             </a:fld>
             <a:endParaRPr lang="tr-TR"/>
           </a:p>
@@ -2081,7 +2081,7 @@
           <a:p>
             <a:fld id="{26396F4E-1D0B-3F44-AA0F-A3430AE5742F}" type="datetimeFigureOut">
               <a:rPr lang="tr-TR" smtClean="0"/>
-              <a:t>6.05.2023</a:t>
+              <a:t>10.05.2024</a:t>
             </a:fld>
             <a:endParaRPr lang="tr-TR"/>
           </a:p>
@@ -2176,7 +2176,7 @@
           <a:p>
             <a:fld id="{26396F4E-1D0B-3F44-AA0F-A3430AE5742F}" type="datetimeFigureOut">
               <a:rPr lang="tr-TR" smtClean="0"/>
-              <a:t>6.05.2023</a:t>
+              <a:t>10.05.2024</a:t>
             </a:fld>
             <a:endParaRPr lang="tr-TR"/>
           </a:p>
@@ -2453,7 +2453,7 @@
           <a:p>
             <a:fld id="{26396F4E-1D0B-3F44-AA0F-A3430AE5742F}" type="datetimeFigureOut">
               <a:rPr lang="tr-TR" smtClean="0"/>
-              <a:t>6.05.2023</a:t>
+              <a:t>10.05.2024</a:t>
             </a:fld>
             <a:endParaRPr lang="tr-TR"/>
           </a:p>
@@ -2710,7 +2710,7 @@
           <a:p>
             <a:fld id="{26396F4E-1D0B-3F44-AA0F-A3430AE5742F}" type="datetimeFigureOut">
               <a:rPr lang="tr-TR" smtClean="0"/>
-              <a:t>6.05.2023</a:t>
+              <a:t>10.05.2024</a:t>
             </a:fld>
             <a:endParaRPr lang="tr-TR"/>
           </a:p>
@@ -2923,7 +2923,7 @@
           <a:p>
             <a:fld id="{26396F4E-1D0B-3F44-AA0F-A3430AE5742F}" type="datetimeFigureOut">
               <a:rPr lang="tr-TR" smtClean="0"/>
-              <a:t>6.05.2023</a:t>
+              <a:t>10.05.2024</a:t>
             </a:fld>
             <a:endParaRPr lang="tr-TR"/>
           </a:p>
@@ -4693,7 +4693,7 @@
             </a:r>
             <a:r>
               <a:rPr lang="tr-TR" dirty="0"/>
-              <a:t> nitelikleri otomatik endekslerler.</a:t>
+              <a:t> nitelikleri otomatik endeksler.</a:t>
             </a:r>
           </a:p>
           <a:p>

</xml_diff>